<commit_message>
flow chart link fix
</commit_message>
<xml_diff>
--- a/public/thesis_flowchart.pptx
+++ b/public/thesis_flowchart.pptx
@@ -254,7 +254,7 @@
           <a:p>
             <a:fld id="{C11135B2-2799-7344-BFFA-55E9A98D16BB}" type="datetimeFigureOut">
               <a:rPr lang="en-US" smtClean="0"/>
-              <a:t>4/13/24</a:t>
+              <a:t>4/15/24</a:t>
             </a:fld>
             <a:endParaRPr lang="en-US"/>
           </a:p>
@@ -424,7 +424,7 @@
           <a:p>
             <a:fld id="{C11135B2-2799-7344-BFFA-55E9A98D16BB}" type="datetimeFigureOut">
               <a:rPr lang="en-US" smtClean="0"/>
-              <a:t>4/13/24</a:t>
+              <a:t>4/15/24</a:t>
             </a:fld>
             <a:endParaRPr lang="en-US"/>
           </a:p>
@@ -604,7 +604,7 @@
           <a:p>
             <a:fld id="{C11135B2-2799-7344-BFFA-55E9A98D16BB}" type="datetimeFigureOut">
               <a:rPr lang="en-US" smtClean="0"/>
-              <a:t>4/13/24</a:t>
+              <a:t>4/15/24</a:t>
             </a:fld>
             <a:endParaRPr lang="en-US"/>
           </a:p>
@@ -774,7 +774,7 @@
           <a:p>
             <a:fld id="{C11135B2-2799-7344-BFFA-55E9A98D16BB}" type="datetimeFigureOut">
               <a:rPr lang="en-US" smtClean="0"/>
-              <a:t>4/13/24</a:t>
+              <a:t>4/15/24</a:t>
             </a:fld>
             <a:endParaRPr lang="en-US"/>
           </a:p>
@@ -1020,7 +1020,7 @@
           <a:p>
             <a:fld id="{C11135B2-2799-7344-BFFA-55E9A98D16BB}" type="datetimeFigureOut">
               <a:rPr lang="en-US" smtClean="0"/>
-              <a:t>4/13/24</a:t>
+              <a:t>4/15/24</a:t>
             </a:fld>
             <a:endParaRPr lang="en-US"/>
           </a:p>
@@ -1252,7 +1252,7 @@
           <a:p>
             <a:fld id="{C11135B2-2799-7344-BFFA-55E9A98D16BB}" type="datetimeFigureOut">
               <a:rPr lang="en-US" smtClean="0"/>
-              <a:t>4/13/24</a:t>
+              <a:t>4/15/24</a:t>
             </a:fld>
             <a:endParaRPr lang="en-US"/>
           </a:p>
@@ -1619,7 +1619,7 @@
           <a:p>
             <a:fld id="{C11135B2-2799-7344-BFFA-55E9A98D16BB}" type="datetimeFigureOut">
               <a:rPr lang="en-US" smtClean="0"/>
-              <a:t>4/13/24</a:t>
+              <a:t>4/15/24</a:t>
             </a:fld>
             <a:endParaRPr lang="en-US"/>
           </a:p>
@@ -1737,7 +1737,7 @@
           <a:p>
             <a:fld id="{C11135B2-2799-7344-BFFA-55E9A98D16BB}" type="datetimeFigureOut">
               <a:rPr lang="en-US" smtClean="0"/>
-              <a:t>4/13/24</a:t>
+              <a:t>4/15/24</a:t>
             </a:fld>
             <a:endParaRPr lang="en-US"/>
           </a:p>
@@ -1832,7 +1832,7 @@
           <a:p>
             <a:fld id="{C11135B2-2799-7344-BFFA-55E9A98D16BB}" type="datetimeFigureOut">
               <a:rPr lang="en-US" smtClean="0"/>
-              <a:t>4/13/24</a:t>
+              <a:t>4/15/24</a:t>
             </a:fld>
             <a:endParaRPr lang="en-US"/>
           </a:p>
@@ -2109,7 +2109,7 @@
           <a:p>
             <a:fld id="{C11135B2-2799-7344-BFFA-55E9A98D16BB}" type="datetimeFigureOut">
               <a:rPr lang="en-US" smtClean="0"/>
-              <a:t>4/13/24</a:t>
+              <a:t>4/15/24</a:t>
             </a:fld>
             <a:endParaRPr lang="en-US"/>
           </a:p>
@@ -2366,7 +2366,7 @@
           <a:p>
             <a:fld id="{C11135B2-2799-7344-BFFA-55E9A98D16BB}" type="datetimeFigureOut">
               <a:rPr lang="en-US" smtClean="0"/>
-              <a:t>4/13/24</a:t>
+              <a:t>4/15/24</a:t>
             </a:fld>
             <a:endParaRPr lang="en-US"/>
           </a:p>
@@ -2579,7 +2579,7 @@
           <a:p>
             <a:fld id="{C11135B2-2799-7344-BFFA-55E9A98D16BB}" type="datetimeFigureOut">
               <a:rPr lang="en-US" smtClean="0"/>
-              <a:t>4/13/24</a:t>
+              <a:t>4/15/24</a:t>
             </a:fld>
             <a:endParaRPr lang="en-US"/>
           </a:p>
@@ -3610,13 +3610,22 @@
               <a:t>Run the </a:t>
             </a:r>
             <a:r>
+              <a:rPr lang="en-US" sz="900" dirty="0" err="1">
+                <a:solidFill>
+                  <a:schemeClr val="tx1"/>
+                </a:solidFill>
+                <a:hlinkClick r:id="rId2"/>
+              </a:rPr>
+              <a:t>preprocessing.py</a:t>
+            </a:r>
+            <a:r>
               <a:rPr lang="en-US" sz="900" dirty="0">
                 <a:solidFill>
                   <a:schemeClr val="tx1"/>
                 </a:solidFill>
                 <a:hlinkClick r:id="rId2"/>
               </a:rPr>
-              <a:t>preprocessing script </a:t>
+              <a:t> </a:t>
             </a:r>
             <a:r>
               <a:rPr lang="en-US" sz="900" dirty="0">
@@ -3624,7 +3633,7 @@
                   <a:schemeClr val="tx1"/>
                 </a:solidFill>
               </a:rPr>
-              <a:t>to:</a:t>
+              <a:t>script to:</a:t>
             </a:r>
           </a:p>
           <a:p>

</xml_diff>

<commit_message>
post-stats analysis and thesis drafting
</commit_message>
<xml_diff>
--- a/public/thesis_flowchart.pptx
+++ b/public/thesis_flowchart.pptx
@@ -254,7 +254,7 @@
           <a:p>
             <a:fld id="{C11135B2-2799-7344-BFFA-55E9A98D16BB}" type="datetimeFigureOut">
               <a:rPr lang="en-US" smtClean="0"/>
-              <a:t>4/15/24</a:t>
+              <a:t>4/17/24</a:t>
             </a:fld>
             <a:endParaRPr lang="en-US"/>
           </a:p>
@@ -424,7 +424,7 @@
           <a:p>
             <a:fld id="{C11135B2-2799-7344-BFFA-55E9A98D16BB}" type="datetimeFigureOut">
               <a:rPr lang="en-US" smtClean="0"/>
-              <a:t>4/15/24</a:t>
+              <a:t>4/17/24</a:t>
             </a:fld>
             <a:endParaRPr lang="en-US"/>
           </a:p>
@@ -604,7 +604,7 @@
           <a:p>
             <a:fld id="{C11135B2-2799-7344-BFFA-55E9A98D16BB}" type="datetimeFigureOut">
               <a:rPr lang="en-US" smtClean="0"/>
-              <a:t>4/15/24</a:t>
+              <a:t>4/17/24</a:t>
             </a:fld>
             <a:endParaRPr lang="en-US"/>
           </a:p>
@@ -774,7 +774,7 @@
           <a:p>
             <a:fld id="{C11135B2-2799-7344-BFFA-55E9A98D16BB}" type="datetimeFigureOut">
               <a:rPr lang="en-US" smtClean="0"/>
-              <a:t>4/15/24</a:t>
+              <a:t>4/17/24</a:t>
             </a:fld>
             <a:endParaRPr lang="en-US"/>
           </a:p>
@@ -1020,7 +1020,7 @@
           <a:p>
             <a:fld id="{C11135B2-2799-7344-BFFA-55E9A98D16BB}" type="datetimeFigureOut">
               <a:rPr lang="en-US" smtClean="0"/>
-              <a:t>4/15/24</a:t>
+              <a:t>4/17/24</a:t>
             </a:fld>
             <a:endParaRPr lang="en-US"/>
           </a:p>
@@ -1252,7 +1252,7 @@
           <a:p>
             <a:fld id="{C11135B2-2799-7344-BFFA-55E9A98D16BB}" type="datetimeFigureOut">
               <a:rPr lang="en-US" smtClean="0"/>
-              <a:t>4/15/24</a:t>
+              <a:t>4/17/24</a:t>
             </a:fld>
             <a:endParaRPr lang="en-US"/>
           </a:p>
@@ -1619,7 +1619,7 @@
           <a:p>
             <a:fld id="{C11135B2-2799-7344-BFFA-55E9A98D16BB}" type="datetimeFigureOut">
               <a:rPr lang="en-US" smtClean="0"/>
-              <a:t>4/15/24</a:t>
+              <a:t>4/17/24</a:t>
             </a:fld>
             <a:endParaRPr lang="en-US"/>
           </a:p>
@@ -1737,7 +1737,7 @@
           <a:p>
             <a:fld id="{C11135B2-2799-7344-BFFA-55E9A98D16BB}" type="datetimeFigureOut">
               <a:rPr lang="en-US" smtClean="0"/>
-              <a:t>4/15/24</a:t>
+              <a:t>4/17/24</a:t>
             </a:fld>
             <a:endParaRPr lang="en-US"/>
           </a:p>
@@ -1832,7 +1832,7 @@
           <a:p>
             <a:fld id="{C11135B2-2799-7344-BFFA-55E9A98D16BB}" type="datetimeFigureOut">
               <a:rPr lang="en-US" smtClean="0"/>
-              <a:t>4/15/24</a:t>
+              <a:t>4/17/24</a:t>
             </a:fld>
             <a:endParaRPr lang="en-US"/>
           </a:p>
@@ -2109,7 +2109,7 @@
           <a:p>
             <a:fld id="{C11135B2-2799-7344-BFFA-55E9A98D16BB}" type="datetimeFigureOut">
               <a:rPr lang="en-US" smtClean="0"/>
-              <a:t>4/15/24</a:t>
+              <a:t>4/17/24</a:t>
             </a:fld>
             <a:endParaRPr lang="en-US"/>
           </a:p>
@@ -2366,7 +2366,7 @@
           <a:p>
             <a:fld id="{C11135B2-2799-7344-BFFA-55E9A98D16BB}" type="datetimeFigureOut">
               <a:rPr lang="en-US" smtClean="0"/>
-              <a:t>4/15/24</a:t>
+              <a:t>4/17/24</a:t>
             </a:fld>
             <a:endParaRPr lang="en-US"/>
           </a:p>
@@ -2579,7 +2579,7 @@
           <a:p>
             <a:fld id="{C11135B2-2799-7344-BFFA-55E9A98D16BB}" type="datetimeFigureOut">
               <a:rPr lang="en-US" smtClean="0"/>
-              <a:t>4/15/24</a:t>
+              <a:t>4/17/24</a:t>
             </a:fld>
             <a:endParaRPr lang="en-US"/>
           </a:p>
@@ -5014,16 +5014,6 @@
             </a:r>
           </a:p>
           <a:p>
-            <a:r>
-              <a:rPr lang="en-US" sz="1000" dirty="0">
-                <a:solidFill>
-                  <a:schemeClr val="tx1"/>
-                </a:solidFill>
-              </a:rPr>
-              <a:t>Use R to:</a:t>
-            </a:r>
-          </a:p>
-          <a:p>
             <a:pPr marL="171450" indent="-171450">
               <a:buFont typeface="Arial" panose="020B0604020202020204" pitchFamily="34" charset="0"/>
               <a:buChar char="•"/>
@@ -5034,7 +5024,7 @@
                   <a:schemeClr val="tx1"/>
                 </a:solidFill>
               </a:rPr>
-              <a:t>Load in the comprehensive statistical dataset.</a:t>
+              <a:t>Load comprehensive statistical dataset.</a:t>
             </a:r>
           </a:p>
           <a:p>

</xml_diff>